<commit_message>
Final tweak of the presentation
</commit_message>
<xml_diff>
--- a/4. Final tool/Final_Presentation.pptx
+++ b/4. Final tool/Final_Presentation.pptx
@@ -247,6 +247,11 @@
       </a:defRPr>
     </a:lvl9pPr>
   </p:defaultTextStyle>
+  <p:extLst>
+    <p:ext uri="{EFAFB233-063F-42B5-8137-9DF3F51BA10A}">
+      <p15:sldGuideLst xmlns:p15="http://schemas.microsoft.com/office/powerpoint/2012/main"/>
+    </p:ext>
+  </p:extLst>
 </p:presentation>
 </file>
 
@@ -11742,23 +11747,7 @@
                   <a:schemeClr val="dk1"/>
                 </a:solidFill>
               </a:rPr>
-              <a:t>Mixed use of API scraping and </a:t>
-            </a:r>
-            <a:r>
-              <a:rPr lang="en-GB" sz="1200" dirty="0" err="1">
-                <a:solidFill>
-                  <a:schemeClr val="dk1"/>
-                </a:solidFill>
-              </a:rPr>
-              <a:t>BeautifulSoup</a:t>
-            </a:r>
-            <a:r>
-              <a:rPr lang="en-GB" sz="1200" dirty="0">
-                <a:solidFill>
-                  <a:schemeClr val="dk1"/>
-                </a:solidFill>
-              </a:rPr>
-              <a:t> to complement available datasets.</a:t>
+              <a:t>Mixed use of API scraping and BeautifulSoup to complement available datasets.</a:t>
             </a:r>
             <a:endParaRPr lang="en-GB" sz="1200" dirty="0"/>
           </a:p>
@@ -11854,23 +11843,26 @@
                   <a:schemeClr val="dk1"/>
                 </a:solidFill>
               </a:rPr>
-              <a:t>Exclusively used </a:t>
+              <a:t>Exclusively used sklearn functionality.</a:t>
             </a:r>
-            <a:r>
-              <a:rPr lang="en" sz="1200" dirty="0" err="1">
-                <a:solidFill>
-                  <a:schemeClr val="dk1"/>
-                </a:solidFill>
-              </a:rPr>
-              <a:t>sklearn</a:t>
-            </a:r>
+          </a:p>
+          <a:p>
+            <a:pPr marL="0" lvl="0" indent="0" algn="ctr" rtl="0">
+              <a:spcBef>
+                <a:spcPts val="0"/>
+              </a:spcBef>
+              <a:spcAft>
+                <a:spcPts val="600"/>
+              </a:spcAft>
+              <a:buNone/>
+            </a:pPr>
             <a:r>
               <a:rPr lang="en" sz="1200" dirty="0">
                 <a:solidFill>
                   <a:schemeClr val="dk1"/>
                 </a:solidFill>
               </a:rPr>
-              <a:t> functionality.</a:t>
+              <a:t>Tfidf-Vectorizer to encode clean news articles.</a:t>
             </a:r>
           </a:p>
           <a:p>
@@ -11883,48 +11875,13 @@
               </a:spcAft>
               <a:buNone/>
             </a:pPr>
-            <a:r>
-              <a:rPr lang="en" sz="1200" dirty="0" err="1">
-                <a:solidFill>
-                  <a:schemeClr val="dk1"/>
-                </a:solidFill>
-              </a:rPr>
-              <a:t>Tfidf</a:t>
-            </a:r>
             <a:r>
               <a:rPr lang="en" sz="1200" dirty="0">
                 <a:solidFill>
                   <a:schemeClr val="dk1"/>
                 </a:solidFill>
               </a:rPr>
-              <a:t>-Vectorizer to encode clean news articles.</a:t>
-            </a:r>
-          </a:p>
-          <a:p>
-            <a:pPr marL="0" lvl="0" indent="0" algn="ctr" rtl="0">
-              <a:spcBef>
-                <a:spcPts val="0"/>
-              </a:spcBef>
-              <a:spcAft>
-                <a:spcPts val="600"/>
-              </a:spcAft>
-              <a:buNone/>
-            </a:pPr>
-            <a:r>
-              <a:rPr lang="en" sz="1200" dirty="0" err="1">
-                <a:solidFill>
-                  <a:schemeClr val="dk1"/>
-                </a:solidFill>
-              </a:rPr>
-              <a:t>PassiveAggressiveClassifier</a:t>
-            </a:r>
-            <a:r>
-              <a:rPr lang="en" sz="1200" dirty="0">
-                <a:solidFill>
-                  <a:schemeClr val="dk1"/>
-                </a:solidFill>
-              </a:rPr>
-              <a:t> to create the actual model.</a:t>
+              <a:t>PassiveAggressiveClassifier to create the actual model.</a:t>
             </a:r>
             <a:endParaRPr sz="1200" dirty="0"/>
           </a:p>
@@ -12265,23 +12222,7 @@
                   <a:schemeClr val="dk1"/>
                 </a:solidFill>
               </a:rPr>
-              <a:t>Basic cleaning and </a:t>
-            </a:r>
-            <a:r>
-              <a:rPr lang="en-GB" sz="1200" dirty="0" err="1">
-                <a:solidFill>
-                  <a:schemeClr val="dk1"/>
-                </a:solidFill>
-              </a:rPr>
-              <a:t>labeling</a:t>
-            </a:r>
-            <a:r>
-              <a:rPr lang="en-GB" sz="1200" dirty="0">
-                <a:solidFill>
-                  <a:schemeClr val="dk1"/>
-                </a:solidFill>
-              </a:rPr>
-              <a:t> with pandas and regex.</a:t>
+              <a:t>Basic cleaning and labelling with pandas and regex.</a:t>
             </a:r>
           </a:p>
           <a:p>
@@ -12318,7 +12259,7 @@
         </p:nvSpPr>
         <p:spPr>
           <a:xfrm>
-            <a:off x="7018519" y="2764452"/>
+            <a:off x="7083831" y="2764452"/>
             <a:ext cx="1726559" cy="427500"/>
           </a:xfrm>
           <a:prstGeom prst="rect">
@@ -12476,7 +12417,7 @@
         </p:nvSpPr>
         <p:spPr>
           <a:xfrm>
-            <a:off x="6855798" y="3191952"/>
+            <a:off x="6921110" y="3191952"/>
             <a:ext cx="2052000" cy="1003200"/>
           </a:xfrm>
           <a:prstGeom prst="rect">
@@ -12750,23 +12691,7 @@
                   <a:schemeClr val="dk1"/>
                 </a:solidFill>
               </a:rPr>
-              <a:t>Visualization of the prediction tool using the </a:t>
-            </a:r>
-            <a:r>
-              <a:rPr lang="en-GB" sz="1200" dirty="0" err="1">
-                <a:solidFill>
-                  <a:schemeClr val="dk1"/>
-                </a:solidFill>
-              </a:rPr>
-              <a:t>Streamlit</a:t>
-            </a:r>
-            <a:r>
-              <a:rPr lang="en-GB" sz="1200" dirty="0">
-                <a:solidFill>
-                  <a:schemeClr val="dk1"/>
-                </a:solidFill>
-              </a:rPr>
-              <a:t> library</a:t>
+              <a:t>Visualization of the prediction tool using the Streamlit library</a:t>
             </a:r>
             <a:endParaRPr lang="en-GB" sz="1200" dirty="0"/>
           </a:p>
@@ -12988,7 +12913,7 @@
         </p:blipFill>
         <p:spPr>
           <a:xfrm>
-            <a:off x="7014643" y="1454726"/>
+            <a:off x="7079955" y="1454726"/>
             <a:ext cx="1811292" cy="905646"/>
           </a:xfrm>
           <a:prstGeom prst="rect">
@@ -12996,6 +12921,156 @@
           </a:prstGeom>
         </p:spPr>
       </p:pic>
+      <p:sp>
+        <p:nvSpPr>
+          <p:cNvPr id="11" name="Chevron 10">
+            <a:extLst>
+              <a:ext uri="{FF2B5EF4-FFF2-40B4-BE49-F238E27FC236}">
+                <a16:creationId xmlns:a16="http://schemas.microsoft.com/office/drawing/2014/main" id="{09B1AF1C-1AD4-0543-A6F7-1C6E1DF6849E}"/>
+              </a:ext>
+            </a:extLst>
+          </p:cNvPr>
+          <p:cNvSpPr/>
+          <p:nvPr/>
+        </p:nvSpPr>
+        <p:spPr>
+          <a:xfrm>
+            <a:off x="2432275" y="1466394"/>
+            <a:ext cx="112893" cy="2849336"/>
+          </a:xfrm>
+          <a:prstGeom prst="chevron">
+            <a:avLst/>
+          </a:prstGeom>
+        </p:spPr>
+        <p:style>
+          <a:lnRef idx="2">
+            <a:schemeClr val="accent1">
+              <a:shade val="50000"/>
+            </a:schemeClr>
+          </a:lnRef>
+          <a:fillRef idx="1">
+            <a:schemeClr val="accent1"/>
+          </a:fillRef>
+          <a:effectRef idx="0">
+            <a:schemeClr val="accent1"/>
+          </a:effectRef>
+          <a:fontRef idx="minor">
+            <a:schemeClr val="lt1"/>
+          </a:fontRef>
+        </p:style>
+        <p:txBody>
+          <a:bodyPr rtlCol="0" anchor="ctr"/>
+          <a:lstStyle/>
+          <a:p>
+            <a:pPr algn="ctr"/>
+            <a:endParaRPr lang="en-US">
+              <a:solidFill>
+                <a:schemeClr val="tx1"/>
+              </a:solidFill>
+            </a:endParaRPr>
+          </a:p>
+        </p:txBody>
+      </p:sp>
+      <p:sp>
+        <p:nvSpPr>
+          <p:cNvPr id="24" name="Chevron 23">
+            <a:extLst>
+              <a:ext uri="{FF2B5EF4-FFF2-40B4-BE49-F238E27FC236}">
+                <a16:creationId xmlns:a16="http://schemas.microsoft.com/office/drawing/2014/main" id="{9AF86414-522F-4943-9D1F-E64F74BEA012}"/>
+              </a:ext>
+            </a:extLst>
+          </p:cNvPr>
+          <p:cNvSpPr/>
+          <p:nvPr/>
+        </p:nvSpPr>
+        <p:spPr>
+          <a:xfrm>
+            <a:off x="4643675" y="1466394"/>
+            <a:ext cx="112893" cy="2849336"/>
+          </a:xfrm>
+          <a:prstGeom prst="chevron">
+            <a:avLst/>
+          </a:prstGeom>
+        </p:spPr>
+        <p:style>
+          <a:lnRef idx="2">
+            <a:schemeClr val="accent1">
+              <a:shade val="50000"/>
+            </a:schemeClr>
+          </a:lnRef>
+          <a:fillRef idx="1">
+            <a:schemeClr val="accent1"/>
+          </a:fillRef>
+          <a:effectRef idx="0">
+            <a:schemeClr val="accent1"/>
+          </a:effectRef>
+          <a:fontRef idx="minor">
+            <a:schemeClr val="lt1"/>
+          </a:fontRef>
+        </p:style>
+        <p:txBody>
+          <a:bodyPr rtlCol="0" anchor="ctr"/>
+          <a:lstStyle/>
+          <a:p>
+            <a:pPr algn="ctr"/>
+            <a:endParaRPr lang="en-US">
+              <a:solidFill>
+                <a:schemeClr val="tx1"/>
+              </a:solidFill>
+            </a:endParaRPr>
+          </a:p>
+        </p:txBody>
+      </p:sp>
+      <p:sp>
+        <p:nvSpPr>
+          <p:cNvPr id="25" name="Chevron 24">
+            <a:extLst>
+              <a:ext uri="{FF2B5EF4-FFF2-40B4-BE49-F238E27FC236}">
+                <a16:creationId xmlns:a16="http://schemas.microsoft.com/office/drawing/2014/main" id="{965BE790-4C9B-524A-A430-906EC58469B0}"/>
+              </a:ext>
+            </a:extLst>
+          </p:cNvPr>
+          <p:cNvSpPr/>
+          <p:nvPr/>
+        </p:nvSpPr>
+        <p:spPr>
+          <a:xfrm>
+            <a:off x="6804342" y="1466394"/>
+            <a:ext cx="112893" cy="2849336"/>
+          </a:xfrm>
+          <a:prstGeom prst="chevron">
+            <a:avLst/>
+          </a:prstGeom>
+        </p:spPr>
+        <p:style>
+          <a:lnRef idx="2">
+            <a:schemeClr val="accent1">
+              <a:shade val="50000"/>
+            </a:schemeClr>
+          </a:lnRef>
+          <a:fillRef idx="1">
+            <a:schemeClr val="accent1"/>
+          </a:fillRef>
+          <a:effectRef idx="0">
+            <a:schemeClr val="accent1"/>
+          </a:effectRef>
+          <a:fontRef idx="minor">
+            <a:schemeClr val="lt1"/>
+          </a:fontRef>
+        </p:style>
+        <p:txBody>
+          <a:bodyPr rtlCol="0" anchor="ctr"/>
+          <a:lstStyle/>
+          <a:p>
+            <a:pPr algn="ctr"/>
+            <a:endParaRPr lang="en-US">
+              <a:solidFill>
+                <a:schemeClr val="tx1"/>
+              </a:solidFill>
+            </a:endParaRPr>
+          </a:p>
+        </p:txBody>
+      </p:sp>
     </p:spTree>
   </p:cSld>
   <p:clrMapOvr>

</xml_diff>

<commit_message>
adding pictures to presentation
</commit_message>
<xml_diff>
--- a/4. Final tool/Final_Presentation.pptx
+++ b/4. Final tool/Final_Presentation.pptx
@@ -13973,8 +13973,8 @@
         </p:nvSpPr>
         <p:spPr>
           <a:xfrm rot="-5400000" flipH="1">
-            <a:off x="5399608" y="1821475"/>
-            <a:ext cx="1975500" cy="2628900"/>
+            <a:off x="5710883" y="729677"/>
+            <a:ext cx="1352950" cy="2628900"/>
           </a:xfrm>
           <a:prstGeom prst="snip1Rect">
             <a:avLst>
@@ -14015,7 +14015,7 @@
         </p:nvCxnSpPr>
         <p:spPr>
           <a:xfrm rot="10800000">
-            <a:off x="6682358" y="2949500"/>
+            <a:off x="6682358" y="2168975"/>
             <a:ext cx="2589600" cy="0"/>
           </a:xfrm>
           <a:prstGeom prst="straightConnector1">
@@ -14041,8 +14041,8 @@
         </p:nvSpPr>
         <p:spPr>
           <a:xfrm rot="5400000">
-            <a:off x="1759800" y="1039900"/>
-            <a:ext cx="1975500" cy="2631000"/>
+            <a:off x="2071075" y="728627"/>
+            <a:ext cx="1352950" cy="2631000"/>
           </a:xfrm>
           <a:prstGeom prst="snip1Rect">
             <a:avLst>
@@ -14155,7 +14155,7 @@
         </p:nvSpPr>
         <p:spPr>
           <a:xfrm>
-            <a:off x="1741950" y="1650025"/>
+            <a:off x="1741950" y="1503068"/>
             <a:ext cx="1760808" cy="1003200"/>
           </a:xfrm>
           <a:prstGeom prst="rect">
@@ -14207,7 +14207,7 @@
         </p:nvSpPr>
         <p:spPr>
           <a:xfrm>
-            <a:off x="1741950" y="2440056"/>
+            <a:off x="1741950" y="2293099"/>
             <a:ext cx="2066479" cy="427500"/>
           </a:xfrm>
         </p:spPr>
@@ -14243,7 +14243,7 @@
         </p:nvSpPr>
         <p:spPr>
           <a:xfrm>
-            <a:off x="5645471" y="2447900"/>
+            <a:off x="5645471" y="1503068"/>
             <a:ext cx="1760808" cy="1003200"/>
           </a:xfrm>
           <a:prstGeom prst="rect">
@@ -14535,7 +14535,7 @@
         </p:nvSpPr>
         <p:spPr>
           <a:xfrm>
-            <a:off x="5354118" y="3146137"/>
+            <a:off x="5354118" y="2201305"/>
             <a:ext cx="2052161" cy="427500"/>
           </a:xfrm>
           <a:prstGeom prst="rect">
@@ -14811,6 +14811,81 @@
           </a:p>
         </p:txBody>
       </p:sp>
+      <p:pic>
+        <p:nvPicPr>
+          <p:cNvPr id="2" name="Picture 1">
+            <a:extLst>
+              <a:ext uri="{FF2B5EF4-FFF2-40B4-BE49-F238E27FC236}">
+                <a16:creationId xmlns:a16="http://schemas.microsoft.com/office/drawing/2014/main" id="{BB746CE1-A97E-4E40-86E1-498FF4F24514}"/>
+              </a:ext>
+            </a:extLst>
+          </p:cNvPr>
+          <p:cNvPicPr>
+            <a:picLocks noChangeAspect="1"/>
+          </p:cNvPicPr>
+          <p:nvPr/>
+        </p:nvPicPr>
+        <p:blipFill>
+          <a:blip r:embed="rId3">
+            <a:grayscl/>
+            <a:extLst>
+              <a:ext uri="{BEBA8EAE-BF5A-486C-A8C5-ECC9F3942E4B}">
+                <a14:imgProps xmlns:a14="http://schemas.microsoft.com/office/drawing/2010/main">
+                  <a14:imgLayer r:embed="rId4">
+                    <a14:imgEffect>
+                      <a14:saturation sat="33000"/>
+                    </a14:imgEffect>
+                  </a14:imgLayer>
+                </a14:imgProps>
+              </a:ext>
+            </a:extLst>
+          </a:blip>
+          <a:stretch>
+            <a:fillRect/>
+          </a:stretch>
+        </p:blipFill>
+        <p:spPr>
+          <a:xfrm>
+            <a:off x="5072907" y="2869236"/>
+            <a:ext cx="2628899" cy="1933229"/>
+          </a:xfrm>
+          <a:prstGeom prst="rect">
+            <a:avLst/>
+          </a:prstGeom>
+        </p:spPr>
+      </p:pic>
+      <p:pic>
+        <p:nvPicPr>
+          <p:cNvPr id="4" name="Picture 3">
+            <a:extLst>
+              <a:ext uri="{FF2B5EF4-FFF2-40B4-BE49-F238E27FC236}">
+                <a16:creationId xmlns:a16="http://schemas.microsoft.com/office/drawing/2014/main" id="{DEDCFA09-D6F8-2240-81C0-2967E092E2A4}"/>
+              </a:ext>
+            </a:extLst>
+          </p:cNvPr>
+          <p:cNvPicPr>
+            <a:picLocks noChangeAspect="1"/>
+          </p:cNvPicPr>
+          <p:nvPr/>
+        </p:nvPicPr>
+        <p:blipFill>
+          <a:blip r:embed="rId5">
+            <a:grayscl/>
+          </a:blip>
+          <a:stretch>
+            <a:fillRect/>
+          </a:stretch>
+        </p:blipFill>
+        <p:spPr>
+          <a:xfrm>
+            <a:off x="1432050" y="2865522"/>
+            <a:ext cx="2628899" cy="1958641"/>
+          </a:xfrm>
+          <a:prstGeom prst="rect">
+            <a:avLst/>
+          </a:prstGeom>
+        </p:spPr>
+      </p:pic>
     </p:spTree>
   </p:cSld>
   <p:clrMapOvr>

</xml_diff>

<commit_message>
final update of presentation
</commit_message>
<xml_diff>
--- a/4. Final tool/Final_Presentation.pptx
+++ b/4. Final tool/Final_Presentation.pptx
@@ -9821,18 +9821,9 @@
               <a:buNone/>
             </a:pPr>
             <a:r>
-              <a:rPr lang="de-DE" dirty="0" err="1"/>
-              <a:t>Fake</a:t>
+              <a:rPr lang="en-GB"/>
+              <a:t>Fake News Identification</a:t>
             </a:r>
-            <a:r>
-              <a:rPr lang="de-DE" dirty="0"/>
-              <a:t> News </a:t>
-            </a:r>
-            <a:r>
-              <a:rPr lang="de-DE" dirty="0" err="1"/>
-              <a:t>Identification</a:t>
-            </a:r>
-            <a:endParaRPr dirty="0"/>
           </a:p>
         </p:txBody>
       </p:sp>
@@ -10374,8 +10365,8 @@
         </p:nvSpPr>
         <p:spPr>
           <a:xfrm>
-            <a:off x="6811558" y="3210901"/>
-            <a:ext cx="1674300" cy="572400"/>
+            <a:off x="6811557" y="3210901"/>
+            <a:ext cx="1736447" cy="572400"/>
           </a:xfrm>
           <a:prstGeom prst="rect">
             <a:avLst/>
@@ -10402,58 +10393,9 @@
               <a:buNone/>
             </a:pPr>
             <a:r>
-              <a:rPr lang="de-DE" dirty="0" err="1"/>
-              <a:t>How</a:t>
+              <a:rPr lang="en-GB"/>
+              <a:t>How well does the model predict fake news?</a:t>
             </a:r>
-            <a:r>
-              <a:rPr lang="de-DE" dirty="0"/>
-              <a:t> </a:t>
-            </a:r>
-            <a:r>
-              <a:rPr lang="de-DE" dirty="0" err="1"/>
-              <a:t>well</a:t>
-            </a:r>
-            <a:r>
-              <a:rPr lang="de-DE" dirty="0"/>
-              <a:t> </a:t>
-            </a:r>
-            <a:r>
-              <a:rPr lang="de-DE" dirty="0" err="1"/>
-              <a:t>does</a:t>
-            </a:r>
-            <a:r>
-              <a:rPr lang="de-DE" dirty="0"/>
-              <a:t> </a:t>
-            </a:r>
-            <a:r>
-              <a:rPr lang="de-DE" dirty="0" err="1"/>
-              <a:t>the</a:t>
-            </a:r>
-            <a:r>
-              <a:rPr lang="de-DE" dirty="0"/>
-              <a:t> </a:t>
-            </a:r>
-            <a:r>
-              <a:rPr lang="de-DE" dirty="0" err="1"/>
-              <a:t>model</a:t>
-            </a:r>
-            <a:r>
-              <a:rPr lang="de-DE" dirty="0"/>
-              <a:t> </a:t>
-            </a:r>
-            <a:r>
-              <a:rPr lang="de-DE" dirty="0" err="1"/>
-              <a:t>predict</a:t>
-            </a:r>
-            <a:r>
-              <a:rPr lang="de-DE" dirty="0"/>
-              <a:t> fake </a:t>
-            </a:r>
-            <a:r>
-              <a:rPr lang="de-DE" dirty="0" err="1"/>
-              <a:t>news</a:t>
-            </a:r>
-            <a:endParaRPr dirty="0"/>
           </a:p>
           <a:p>
             <a:pPr marL="0" lvl="0" indent="0" algn="l" rtl="0">
@@ -10465,7 +10407,7 @@
               </a:spcAft>
               <a:buNone/>
             </a:pPr>
-            <a:endParaRPr dirty="0"/>
+            <a:endParaRPr lang="en-GB"/>
           </a:p>
         </p:txBody>
       </p:sp>
@@ -11742,14 +11684,14 @@
               <a:buNone/>
             </a:pPr>
             <a:r>
-              <a:rPr lang="en-GB" sz="1200" dirty="0">
+              <a:rPr lang="en-GB" dirty="0">
                 <a:solidFill>
                   <a:schemeClr val="dk1"/>
                 </a:solidFill>
               </a:rPr>
               <a:t>Mixed use of API scraping and BeautifulSoup to complement available datasets.</a:t>
             </a:r>
-            <a:endParaRPr lang="en-GB" sz="1200" dirty="0"/>
+            <a:endParaRPr lang="en-GB" dirty="0"/>
           </a:p>
         </p:txBody>
       </p:sp>
@@ -11838,12 +11780,12 @@
               <a:buNone/>
             </a:pPr>
             <a:r>
-              <a:rPr lang="en" sz="1200" dirty="0">
+              <a:rPr lang="en" dirty="0">
                 <a:solidFill>
                   <a:schemeClr val="dk1"/>
                 </a:solidFill>
               </a:rPr>
-              <a:t>Exclusively used sklearn functionality.</a:t>
+              <a:t>Tfidf-Vectorizer to encode the clean news articles.</a:t>
             </a:r>
           </a:p>
           <a:p>
@@ -11857,33 +11799,14 @@
               <a:buNone/>
             </a:pPr>
             <a:r>
-              <a:rPr lang="en" sz="1200" dirty="0">
-                <a:solidFill>
-                  <a:schemeClr val="dk1"/>
-                </a:solidFill>
-              </a:rPr>
-              <a:t>Tfidf-Vectorizer to encode clean news articles.</a:t>
-            </a:r>
-          </a:p>
-          <a:p>
-            <a:pPr marL="0" lvl="0" indent="0" algn="ctr" rtl="0">
-              <a:spcBef>
-                <a:spcPts val="0"/>
-              </a:spcBef>
-              <a:spcAft>
-                <a:spcPts val="600"/>
-              </a:spcAft>
-              <a:buNone/>
-            </a:pPr>
-            <a:r>
-              <a:rPr lang="en" sz="1200" dirty="0">
+              <a:rPr lang="en" dirty="0">
                 <a:solidFill>
                   <a:schemeClr val="dk1"/>
                 </a:solidFill>
               </a:rPr>
               <a:t>PassiveAggressiveClassifier to create the actual model.</a:t>
             </a:r>
-            <a:endParaRPr sz="1200" dirty="0"/>
+            <a:endParaRPr dirty="0"/>
           </a:p>
         </p:txBody>
       </p:sp>
@@ -12217,7 +12140,7 @@
               </a:spcAft>
             </a:pPr>
             <a:r>
-              <a:rPr lang="en-GB" sz="1200" dirty="0">
+              <a:rPr lang="en-GB" dirty="0">
                 <a:solidFill>
                   <a:schemeClr val="dk1"/>
                 </a:solidFill>
@@ -12232,14 +12155,14 @@
               </a:spcAft>
             </a:pPr>
             <a:r>
-              <a:rPr lang="en-GB" sz="1200" dirty="0">
+              <a:rPr lang="en-GB" dirty="0">
                 <a:solidFill>
                   <a:schemeClr val="dk1"/>
                 </a:solidFill>
               </a:rPr>
               <a:t>Additional cleaning of stop words using NLTK.</a:t>
             </a:r>
-            <a:endParaRPr lang="en-GB" sz="1200" dirty="0"/>
+            <a:endParaRPr lang="en-GB" dirty="0"/>
           </a:p>
         </p:txBody>
       </p:sp>
@@ -12686,14 +12609,14 @@
               </a:spcAft>
             </a:pPr>
             <a:r>
-              <a:rPr lang="en-GB" sz="1200" dirty="0">
+              <a:rPr lang="en-GB" dirty="0">
                 <a:solidFill>
                   <a:schemeClr val="dk1"/>
                 </a:solidFill>
               </a:rPr>
               <a:t>Visualization of the prediction tool using the Streamlit library</a:t>
             </a:r>
-            <a:endParaRPr lang="en-GB" sz="1200" dirty="0"/>
+            <a:endParaRPr lang="en-GB" dirty="0"/>
           </a:p>
         </p:txBody>
       </p:sp>
@@ -13497,7 +13420,7 @@
               <a:buNone/>
             </a:pPr>
             <a:r>
-              <a:rPr lang="en-GB" b="1" dirty="0">
+              <a:rPr lang="en-GB" b="1">
                 <a:solidFill>
                   <a:srgbClr val="434343"/>
                 </a:solidFill>
@@ -13506,41 +13429,8 @@
                 <a:cs typeface="Exo 2"/>
                 <a:sym typeface="Exo 2"/>
               </a:rPr>
-              <a:t>F</a:t>
+              <a:t>Final data set</a:t>
             </a:r>
-            <a:r>
-              <a:rPr lang="en" b="1" dirty="0" err="1">
-                <a:solidFill>
-                  <a:srgbClr val="434343"/>
-                </a:solidFill>
-                <a:latin typeface="Exo 2"/>
-                <a:ea typeface="Exo 2"/>
-                <a:cs typeface="Exo 2"/>
-                <a:sym typeface="Exo 2"/>
-              </a:rPr>
-              <a:t>inal</a:t>
-            </a:r>
-            <a:r>
-              <a:rPr lang="en" b="1" dirty="0">
-                <a:solidFill>
-                  <a:srgbClr val="434343"/>
-                </a:solidFill>
-                <a:latin typeface="Exo 2"/>
-                <a:ea typeface="Exo 2"/>
-                <a:cs typeface="Exo 2"/>
-                <a:sym typeface="Exo 2"/>
-              </a:rPr>
-              <a:t> data set</a:t>
-            </a:r>
-            <a:endParaRPr b="1" dirty="0">
-              <a:solidFill>
-                <a:srgbClr val="434343"/>
-              </a:solidFill>
-              <a:latin typeface="Exo 2"/>
-              <a:ea typeface="Exo 2"/>
-              <a:cs typeface="Exo 2"/>
-              <a:sym typeface="Exo 2"/>
-            </a:endParaRPr>
           </a:p>
         </p:txBody>
       </p:sp>
@@ -14207,7 +14097,7 @@
         </p:nvSpPr>
         <p:spPr>
           <a:xfrm>
-            <a:off x="1741950" y="2293099"/>
+            <a:off x="1713259" y="2195651"/>
             <a:ext cx="2066479" cy="427500"/>
           </a:xfrm>
         </p:spPr>

</xml_diff>